<commit_message>
Add a new teaser
</commit_message>
<xml_diff>
--- a/report/results/teaser.pptx
+++ b/report/results/teaser.pptx
@@ -6,6 +6,7 @@
   </p:sldMasterIdLst>
   <p:sldIdLst>
     <p:sldId id="256" r:id="rId2"/>
+    <p:sldId id="257" r:id="rId3"/>
   </p:sldIdLst>
   <p:sldSz cx="12192000" cy="6858000"/>
   <p:notesSz cx="6858000" cy="9144000"/>
@@ -243,7 +244,7 @@
           <a:p>
             <a:fld id="{076450C3-D1E8-C847-AF75-8B566C641C4C}" type="datetimeFigureOut">
               <a:rPr lang="en-US" smtClean="0"/>
-              <a:t>12/8/16</a:t>
+              <a:t>12/9/16</a:t>
             </a:fld>
             <a:endParaRPr lang="en-US"/>
           </a:p>
@@ -413,7 +414,7 @@
           <a:p>
             <a:fld id="{076450C3-D1E8-C847-AF75-8B566C641C4C}" type="datetimeFigureOut">
               <a:rPr lang="en-US" smtClean="0"/>
-              <a:t>12/8/16</a:t>
+              <a:t>12/9/16</a:t>
             </a:fld>
             <a:endParaRPr lang="en-US"/>
           </a:p>
@@ -593,7 +594,7 @@
           <a:p>
             <a:fld id="{076450C3-D1E8-C847-AF75-8B566C641C4C}" type="datetimeFigureOut">
               <a:rPr lang="en-US" smtClean="0"/>
-              <a:t>12/8/16</a:t>
+              <a:t>12/9/16</a:t>
             </a:fld>
             <a:endParaRPr lang="en-US"/>
           </a:p>
@@ -763,7 +764,7 @@
           <a:p>
             <a:fld id="{076450C3-D1E8-C847-AF75-8B566C641C4C}" type="datetimeFigureOut">
               <a:rPr lang="en-US" smtClean="0"/>
-              <a:t>12/8/16</a:t>
+              <a:t>12/9/16</a:t>
             </a:fld>
             <a:endParaRPr lang="en-US"/>
           </a:p>
@@ -1009,7 +1010,7 @@
           <a:p>
             <a:fld id="{076450C3-D1E8-C847-AF75-8B566C641C4C}" type="datetimeFigureOut">
               <a:rPr lang="en-US" smtClean="0"/>
-              <a:t>12/8/16</a:t>
+              <a:t>12/9/16</a:t>
             </a:fld>
             <a:endParaRPr lang="en-US"/>
           </a:p>
@@ -1241,7 +1242,7 @@
           <a:p>
             <a:fld id="{076450C3-D1E8-C847-AF75-8B566C641C4C}" type="datetimeFigureOut">
               <a:rPr lang="en-US" smtClean="0"/>
-              <a:t>12/8/16</a:t>
+              <a:t>12/9/16</a:t>
             </a:fld>
             <a:endParaRPr lang="en-US"/>
           </a:p>
@@ -1608,7 +1609,7 @@
           <a:p>
             <a:fld id="{076450C3-D1E8-C847-AF75-8B566C641C4C}" type="datetimeFigureOut">
               <a:rPr lang="en-US" smtClean="0"/>
-              <a:t>12/8/16</a:t>
+              <a:t>12/9/16</a:t>
             </a:fld>
             <a:endParaRPr lang="en-US"/>
           </a:p>
@@ -1726,7 +1727,7 @@
           <a:p>
             <a:fld id="{076450C3-D1E8-C847-AF75-8B566C641C4C}" type="datetimeFigureOut">
               <a:rPr lang="en-US" smtClean="0"/>
-              <a:t>12/8/16</a:t>
+              <a:t>12/9/16</a:t>
             </a:fld>
             <a:endParaRPr lang="en-US"/>
           </a:p>
@@ -1821,7 +1822,7 @@
           <a:p>
             <a:fld id="{076450C3-D1E8-C847-AF75-8B566C641C4C}" type="datetimeFigureOut">
               <a:rPr lang="en-US" smtClean="0"/>
-              <a:t>12/8/16</a:t>
+              <a:t>12/9/16</a:t>
             </a:fld>
             <a:endParaRPr lang="en-US"/>
           </a:p>
@@ -2098,7 +2099,7 @@
           <a:p>
             <a:fld id="{076450C3-D1E8-C847-AF75-8B566C641C4C}" type="datetimeFigureOut">
               <a:rPr lang="en-US" smtClean="0"/>
-              <a:t>12/8/16</a:t>
+              <a:t>12/9/16</a:t>
             </a:fld>
             <a:endParaRPr lang="en-US"/>
           </a:p>
@@ -2351,7 +2352,7 @@
           <a:p>
             <a:fld id="{076450C3-D1E8-C847-AF75-8B566C641C4C}" type="datetimeFigureOut">
               <a:rPr lang="en-US" smtClean="0"/>
-              <a:t>12/8/16</a:t>
+              <a:t>12/9/16</a:t>
             </a:fld>
             <a:endParaRPr lang="en-US"/>
           </a:p>
@@ -2564,7 +2565,7 @@
           <a:p>
             <a:fld id="{076450C3-D1E8-C847-AF75-8B566C641C4C}" type="datetimeFigureOut">
               <a:rPr lang="en-US" smtClean="0"/>
-              <a:t>12/8/16</a:t>
+              <a:t>12/9/16</a:t>
             </a:fld>
             <a:endParaRPr lang="en-US"/>
           </a:p>
@@ -3129,15 +3130,7 @@
                 <a:ea typeface="Times New Roman" charset="0"/>
                 <a:cs typeface="Times New Roman" charset="0"/>
               </a:rPr>
-              <a:t>Starry </a:t>
-            </a:r>
-            <a:r>
-              <a:rPr lang="en-US" sz="1600" i="1" dirty="0" smtClean="0">
-                <a:latin typeface="Times New Roman" charset="0"/>
-                <a:ea typeface="Times New Roman" charset="0"/>
-                <a:cs typeface="Times New Roman" charset="0"/>
-              </a:rPr>
-              <a:t>Night</a:t>
+              <a:t>Starry Night</a:t>
             </a:r>
             <a:endParaRPr lang="en-US" sz="1600" i="1" dirty="0">
               <a:latin typeface="Times New Roman" charset="0"/>
@@ -3192,15 +3185,7 @@
                 <a:ea typeface="Times New Roman" charset="0"/>
                 <a:cs typeface="Times New Roman" charset="0"/>
               </a:rPr>
-              <a:t>cene </a:t>
-            </a:r>
-            <a:r>
-              <a:rPr lang="en-US" sz="1600" dirty="0" smtClean="0">
-                <a:latin typeface="Times New Roman" charset="0"/>
-                <a:ea typeface="Times New Roman" charset="0"/>
-                <a:cs typeface="Times New Roman" charset="0"/>
-              </a:rPr>
-              <a:t>with large variations in depth</a:t>
+              <a:t>cene with large variations in depth</a:t>
             </a:r>
             <a:endParaRPr lang="en-US" sz="1600" i="1" dirty="0">
               <a:latin typeface="Times New Roman" charset="0"/>
@@ -3308,6 +3293,362 @@
     <p:extLst>
       <p:ext uri="{BB962C8B-B14F-4D97-AF65-F5344CB8AC3E}">
         <p14:creationId xmlns:p14="http://schemas.microsoft.com/office/powerpoint/2010/main" val="213951777"/>
+      </p:ext>
+    </p:extLst>
+  </p:cSld>
+  <p:clrMapOvr>
+    <a:masterClrMapping/>
+  </p:clrMapOvr>
+  <p:timing>
+    <p:tnLst>
+      <p:par>
+        <p:cTn id="1" dur="indefinite" restart="never" nodeType="tmRoot"/>
+      </p:par>
+    </p:tnLst>
+  </p:timing>
+</p:sld>
+</file>
+
+<file path=ppt/slides/slide2.xml><?xml version="1.0" encoding="utf-8"?>
+<p:sld xmlns:a="http://schemas.openxmlformats.org/drawingml/2006/main" xmlns:r="http://schemas.openxmlformats.org/officeDocument/2006/relationships" xmlns:p="http://schemas.openxmlformats.org/presentationml/2006/main">
+  <p:cSld>
+    <p:spTree>
+      <p:nvGrpSpPr>
+        <p:cNvPr id="1" name=""/>
+        <p:cNvGrpSpPr/>
+        <p:nvPr/>
+      </p:nvGrpSpPr>
+      <p:grpSpPr>
+        <a:xfrm>
+          <a:off x="0" y="0"/>
+          <a:ext cx="0" cy="0"/>
+          <a:chOff x="0" y="0"/>
+          <a:chExt cx="0" cy="0"/>
+        </a:xfrm>
+      </p:grpSpPr>
+      <p:pic>
+        <p:nvPicPr>
+          <p:cNvPr id="7" name="Picture 6"/>
+          <p:cNvPicPr>
+            <a:picLocks noChangeAspect="1"/>
+          </p:cNvPicPr>
+          <p:nvPr/>
+        </p:nvPicPr>
+        <p:blipFill>
+          <a:blip r:embed="rId2">
+            <a:extLst>
+              <a:ext uri="{28A0092B-C50C-407E-A947-70E740481C1C}">
+                <a14:useLocalDpi xmlns:a14="http://schemas.microsoft.com/office/drawing/2010/main" val="0"/>
+              </a:ext>
+            </a:extLst>
+          </a:blip>
+          <a:stretch>
+            <a:fillRect/>
+          </a:stretch>
+        </p:blipFill>
+        <p:spPr>
+          <a:xfrm>
+            <a:off x="132194" y="2331720"/>
+            <a:ext cx="1463040" cy="914400"/>
+          </a:xfrm>
+          <a:prstGeom prst="rect">
+            <a:avLst/>
+          </a:prstGeom>
+        </p:spPr>
+      </p:pic>
+      <p:sp>
+        <p:nvSpPr>
+          <p:cNvPr id="13" name="TextBox 12"/>
+          <p:cNvSpPr txBox="1"/>
+          <p:nvPr/>
+        </p:nvSpPr>
+        <p:spPr>
+          <a:xfrm>
+            <a:off x="240467" y="3347144"/>
+            <a:ext cx="1246494" cy="584775"/>
+          </a:xfrm>
+          <a:prstGeom prst="rect">
+            <a:avLst/>
+          </a:prstGeom>
+          <a:noFill/>
+        </p:spPr>
+        <p:txBody>
+          <a:bodyPr wrap="square" rtlCol="0">
+            <a:spAutoFit/>
+          </a:bodyPr>
+          <a:lstStyle/>
+          <a:p>
+            <a:pPr algn="ctr"/>
+            <a:r>
+              <a:rPr lang="en-US" sz="1600" b="1" dirty="0" smtClean="0">
+                <a:latin typeface="Times New Roman" charset="0"/>
+                <a:ea typeface="Times New Roman" charset="0"/>
+                <a:cs typeface="Times New Roman" charset="0"/>
+              </a:rPr>
+              <a:t>Style</a:t>
+            </a:r>
+          </a:p>
+          <a:p>
+            <a:pPr algn="ctr"/>
+            <a:r>
+              <a:rPr lang="en-US" sz="1600" i="1" dirty="0" smtClean="0">
+                <a:latin typeface="Times New Roman" charset="0"/>
+                <a:ea typeface="Times New Roman" charset="0"/>
+                <a:cs typeface="Times New Roman" charset="0"/>
+              </a:rPr>
+              <a:t>Starry Night</a:t>
+            </a:r>
+            <a:endParaRPr lang="en-US" sz="1600" i="1" dirty="0">
+              <a:latin typeface="Times New Roman" charset="0"/>
+              <a:ea typeface="Times New Roman" charset="0"/>
+              <a:cs typeface="Times New Roman" charset="0"/>
+            </a:endParaRPr>
+          </a:p>
+        </p:txBody>
+      </p:sp>
+      <p:sp>
+        <p:nvSpPr>
+          <p:cNvPr id="14" name="TextBox 13"/>
+          <p:cNvSpPr txBox="1"/>
+          <p:nvPr/>
+        </p:nvSpPr>
+        <p:spPr>
+          <a:xfrm>
+            <a:off x="1680666" y="4291019"/>
+            <a:ext cx="3455425" cy="338554"/>
+          </a:xfrm>
+          <a:prstGeom prst="rect">
+            <a:avLst/>
+          </a:prstGeom>
+          <a:noFill/>
+        </p:spPr>
+        <p:txBody>
+          <a:bodyPr wrap="square" rtlCol="0">
+            <a:spAutoFit/>
+          </a:bodyPr>
+          <a:lstStyle/>
+          <a:p>
+            <a:pPr algn="ctr"/>
+            <a:r>
+              <a:rPr lang="en-US" sz="1600" dirty="0" smtClean="0">
+                <a:latin typeface="Times New Roman" charset="0"/>
+                <a:ea typeface="Times New Roman" charset="0"/>
+                <a:cs typeface="Times New Roman" charset="0"/>
+              </a:rPr>
+              <a:t>(A) </a:t>
+            </a:r>
+            <a:r>
+              <a:rPr lang="en-US" altLang="zh-CN" sz="1600" dirty="0" smtClean="0">
+                <a:latin typeface="Times New Roman" charset="0"/>
+                <a:ea typeface="Times New Roman" charset="0"/>
+                <a:cs typeface="Times New Roman" charset="0"/>
+              </a:rPr>
+              <a:t>S</a:t>
+            </a:r>
+            <a:r>
+              <a:rPr lang="en-US" sz="1600" dirty="0" smtClean="0">
+                <a:latin typeface="Times New Roman" charset="0"/>
+                <a:ea typeface="Times New Roman" charset="0"/>
+                <a:cs typeface="Times New Roman" charset="0"/>
+              </a:rPr>
+              <a:t>cene with large variations in depth</a:t>
+            </a:r>
+            <a:endParaRPr lang="en-US" sz="1600" i="1" dirty="0">
+              <a:latin typeface="Times New Roman" charset="0"/>
+              <a:ea typeface="Times New Roman" charset="0"/>
+              <a:cs typeface="Times New Roman" charset="0"/>
+            </a:endParaRPr>
+          </a:p>
+        </p:txBody>
+      </p:sp>
+      <p:sp>
+        <p:nvSpPr>
+          <p:cNvPr id="15" name="TextBox 14"/>
+          <p:cNvSpPr txBox="1"/>
+          <p:nvPr/>
+        </p:nvSpPr>
+        <p:spPr>
+          <a:xfrm>
+            <a:off x="5268044" y="4291019"/>
+            <a:ext cx="3296142" cy="338554"/>
+          </a:xfrm>
+          <a:prstGeom prst="rect">
+            <a:avLst/>
+          </a:prstGeom>
+          <a:noFill/>
+        </p:spPr>
+        <p:txBody>
+          <a:bodyPr wrap="square" rtlCol="0">
+            <a:spAutoFit/>
+          </a:bodyPr>
+          <a:lstStyle/>
+          <a:p>
+            <a:pPr algn="ctr"/>
+            <a:r>
+              <a:rPr lang="en-US" sz="1600" dirty="0" smtClean="0">
+                <a:latin typeface="Times New Roman" charset="0"/>
+                <a:ea typeface="Times New Roman" charset="0"/>
+                <a:cs typeface="Times New Roman" charset="0"/>
+              </a:rPr>
+              <a:t>(B) Johnson </a:t>
+            </a:r>
+            <a:r>
+              <a:rPr lang="en-US" sz="1600" i="1" dirty="0" smtClean="0">
+                <a:latin typeface="Times New Roman" charset="0"/>
+                <a:ea typeface="Times New Roman" charset="0"/>
+                <a:cs typeface="Times New Roman" charset="0"/>
+              </a:rPr>
+              <a:t>et al.</a:t>
+            </a:r>
+            <a:r>
+              <a:rPr lang="en-US" sz="1600" dirty="0" smtClean="0">
+                <a:latin typeface="Times New Roman" charset="0"/>
+                <a:ea typeface="Times New Roman" charset="0"/>
+                <a:cs typeface="Times New Roman" charset="0"/>
+              </a:rPr>
+              <a:t>, 2016</a:t>
+            </a:r>
+            <a:endParaRPr lang="en-US" sz="1600" i="1" dirty="0">
+              <a:latin typeface="Times New Roman" charset="0"/>
+              <a:ea typeface="Times New Roman" charset="0"/>
+              <a:cs typeface="Times New Roman" charset="0"/>
+            </a:endParaRPr>
+          </a:p>
+        </p:txBody>
+      </p:sp>
+      <p:sp>
+        <p:nvSpPr>
+          <p:cNvPr id="16" name="TextBox 15"/>
+          <p:cNvSpPr txBox="1"/>
+          <p:nvPr/>
+        </p:nvSpPr>
+        <p:spPr>
+          <a:xfrm>
+            <a:off x="8768887" y="4291019"/>
+            <a:ext cx="3296150" cy="338554"/>
+          </a:xfrm>
+          <a:prstGeom prst="rect">
+            <a:avLst/>
+          </a:prstGeom>
+          <a:noFill/>
+        </p:spPr>
+        <p:txBody>
+          <a:bodyPr wrap="square" rtlCol="0">
+            <a:spAutoFit/>
+          </a:bodyPr>
+          <a:lstStyle/>
+          <a:p>
+            <a:pPr algn="ctr"/>
+            <a:r>
+              <a:rPr lang="en-US" sz="1600" dirty="0" smtClean="0">
+                <a:latin typeface="Times New Roman" charset="0"/>
+                <a:ea typeface="Times New Roman" charset="0"/>
+                <a:cs typeface="Times New Roman" charset="0"/>
+              </a:rPr>
+              <a:t>(C) Our depth-preserving results</a:t>
+            </a:r>
+            <a:endParaRPr lang="en-US" sz="1600" i="1" dirty="0">
+              <a:latin typeface="Times New Roman" charset="0"/>
+              <a:ea typeface="Times New Roman" charset="0"/>
+              <a:cs typeface="Times New Roman" charset="0"/>
+            </a:endParaRPr>
+          </a:p>
+        </p:txBody>
+      </p:sp>
+      <p:pic>
+        <p:nvPicPr>
+          <p:cNvPr id="3" name="Picture 2"/>
+          <p:cNvPicPr>
+            <a:picLocks noChangeAspect="1"/>
+          </p:cNvPicPr>
+          <p:nvPr/>
+        </p:nvPicPr>
+        <p:blipFill>
+          <a:blip r:embed="rId3">
+            <a:extLst>
+              <a:ext uri="{28A0092B-C50C-407E-A947-70E740481C1C}">
+                <a14:useLocalDpi xmlns:a14="http://schemas.microsoft.com/office/drawing/2010/main" val="0"/>
+              </a:ext>
+            </a:extLst>
+          </a:blip>
+          <a:stretch>
+            <a:fillRect/>
+          </a:stretch>
+        </p:blipFill>
+        <p:spPr>
+          <a:xfrm>
+            <a:off x="5221525" y="2331720"/>
+            <a:ext cx="3389180" cy="1920240"/>
+          </a:xfrm>
+          <a:prstGeom prst="rect">
+            <a:avLst/>
+          </a:prstGeom>
+        </p:spPr>
+      </p:pic>
+      <p:pic>
+        <p:nvPicPr>
+          <p:cNvPr id="8" name="Picture 7"/>
+          <p:cNvPicPr>
+            <a:picLocks noChangeAspect="1"/>
+          </p:cNvPicPr>
+          <p:nvPr/>
+        </p:nvPicPr>
+        <p:blipFill>
+          <a:blip r:embed="rId4">
+            <a:extLst>
+              <a:ext uri="{28A0092B-C50C-407E-A947-70E740481C1C}">
+                <a14:useLocalDpi xmlns:a14="http://schemas.microsoft.com/office/drawing/2010/main" val="0"/>
+              </a:ext>
+            </a:extLst>
+          </a:blip>
+          <a:stretch>
+            <a:fillRect/>
+          </a:stretch>
+        </p:blipFill>
+        <p:spPr>
+          <a:xfrm>
+            <a:off x="8722372" y="2331720"/>
+            <a:ext cx="3389180" cy="1920240"/>
+          </a:xfrm>
+          <a:prstGeom prst="rect">
+            <a:avLst/>
+          </a:prstGeom>
+        </p:spPr>
+      </p:pic>
+      <p:pic>
+        <p:nvPicPr>
+          <p:cNvPr id="9" name="Picture 8"/>
+          <p:cNvPicPr>
+            <a:picLocks noChangeAspect="1"/>
+          </p:cNvPicPr>
+          <p:nvPr/>
+        </p:nvPicPr>
+        <p:blipFill>
+          <a:blip r:embed="rId5">
+            <a:extLst>
+              <a:ext uri="{28A0092B-C50C-407E-A947-70E740481C1C}">
+                <a14:useLocalDpi xmlns:a14="http://schemas.microsoft.com/office/drawing/2010/main" val="0"/>
+              </a:ext>
+            </a:extLst>
+          </a:blip>
+          <a:stretch>
+            <a:fillRect/>
+          </a:stretch>
+        </p:blipFill>
+        <p:spPr>
+          <a:xfrm>
+            <a:off x="1706901" y="2331720"/>
+            <a:ext cx="3402957" cy="1920240"/>
+          </a:xfrm>
+          <a:prstGeom prst="rect">
+            <a:avLst/>
+          </a:prstGeom>
+        </p:spPr>
+      </p:pic>
+    </p:spTree>
+    <p:extLst>
+      <p:ext uri="{BB962C8B-B14F-4D97-AF65-F5344CB8AC3E}">
+        <p14:creationId xmlns:p14="http://schemas.microsoft.com/office/powerpoint/2010/main" val="467279208"/>
       </p:ext>
     </p:extLst>
   </p:cSld>

</xml_diff>